<commit_message>
Add color palette slide
</commit_message>
<xml_diff>
--- a/files/designLayout_and_ColorPallete.pptx
+++ b/files/designLayout_and_ColorPallete.pptx
@@ -246,7 +246,7 @@
           <a:p>
             <a:fld id="{3748C6B8-2EEC-4295-82C3-80A504CA7F35}" type="datetimeFigureOut">
               <a:rPr lang="en-US" smtClean="0"/>
-              <a:t>26-Jul-25</a:t>
+              <a:t>01-Aug-25</a:t>
             </a:fld>
             <a:endParaRPr lang="en-US"/>
           </a:p>
@@ -416,7 +416,7 @@
           <a:p>
             <a:fld id="{3748C6B8-2EEC-4295-82C3-80A504CA7F35}" type="datetimeFigureOut">
               <a:rPr lang="en-US" smtClean="0"/>
-              <a:t>26-Jul-25</a:t>
+              <a:t>01-Aug-25</a:t>
             </a:fld>
             <a:endParaRPr lang="en-US"/>
           </a:p>
@@ -596,7 +596,7 @@
           <a:p>
             <a:fld id="{3748C6B8-2EEC-4295-82C3-80A504CA7F35}" type="datetimeFigureOut">
               <a:rPr lang="en-US" smtClean="0"/>
-              <a:t>26-Jul-25</a:t>
+              <a:t>01-Aug-25</a:t>
             </a:fld>
             <a:endParaRPr lang="en-US"/>
           </a:p>
@@ -766,7 +766,7 @@
           <a:p>
             <a:fld id="{3748C6B8-2EEC-4295-82C3-80A504CA7F35}" type="datetimeFigureOut">
               <a:rPr lang="en-US" smtClean="0"/>
-              <a:t>26-Jul-25</a:t>
+              <a:t>01-Aug-25</a:t>
             </a:fld>
             <a:endParaRPr lang="en-US"/>
           </a:p>
@@ -1012,7 +1012,7 @@
           <a:p>
             <a:fld id="{3748C6B8-2EEC-4295-82C3-80A504CA7F35}" type="datetimeFigureOut">
               <a:rPr lang="en-US" smtClean="0"/>
-              <a:t>26-Jul-25</a:t>
+              <a:t>01-Aug-25</a:t>
             </a:fld>
             <a:endParaRPr lang="en-US"/>
           </a:p>
@@ -1244,7 +1244,7 @@
           <a:p>
             <a:fld id="{3748C6B8-2EEC-4295-82C3-80A504CA7F35}" type="datetimeFigureOut">
               <a:rPr lang="en-US" smtClean="0"/>
-              <a:t>26-Jul-25</a:t>
+              <a:t>01-Aug-25</a:t>
             </a:fld>
             <a:endParaRPr lang="en-US"/>
           </a:p>
@@ -1611,7 +1611,7 @@
           <a:p>
             <a:fld id="{3748C6B8-2EEC-4295-82C3-80A504CA7F35}" type="datetimeFigureOut">
               <a:rPr lang="en-US" smtClean="0"/>
-              <a:t>26-Jul-25</a:t>
+              <a:t>01-Aug-25</a:t>
             </a:fld>
             <a:endParaRPr lang="en-US"/>
           </a:p>
@@ -1729,7 +1729,7 @@
           <a:p>
             <a:fld id="{3748C6B8-2EEC-4295-82C3-80A504CA7F35}" type="datetimeFigureOut">
               <a:rPr lang="en-US" smtClean="0"/>
-              <a:t>26-Jul-25</a:t>
+              <a:t>01-Aug-25</a:t>
             </a:fld>
             <a:endParaRPr lang="en-US"/>
           </a:p>
@@ -1824,7 +1824,7 @@
           <a:p>
             <a:fld id="{3748C6B8-2EEC-4295-82C3-80A504CA7F35}" type="datetimeFigureOut">
               <a:rPr lang="en-US" smtClean="0"/>
-              <a:t>26-Jul-25</a:t>
+              <a:t>01-Aug-25</a:t>
             </a:fld>
             <a:endParaRPr lang="en-US"/>
           </a:p>
@@ -2101,7 +2101,7 @@
           <a:p>
             <a:fld id="{3748C6B8-2EEC-4295-82C3-80A504CA7F35}" type="datetimeFigureOut">
               <a:rPr lang="en-US" smtClean="0"/>
-              <a:t>26-Jul-25</a:t>
+              <a:t>01-Aug-25</a:t>
             </a:fld>
             <a:endParaRPr lang="en-US"/>
           </a:p>
@@ -2354,7 +2354,7 @@
           <a:p>
             <a:fld id="{3748C6B8-2EEC-4295-82C3-80A504CA7F35}" type="datetimeFigureOut">
               <a:rPr lang="en-US" smtClean="0"/>
-              <a:t>26-Jul-25</a:t>
+              <a:t>01-Aug-25</a:t>
             </a:fld>
             <a:endParaRPr lang="en-US"/>
           </a:p>
@@ -2567,7 +2567,7 @@
           <a:p>
             <a:fld id="{3748C6B8-2EEC-4295-82C3-80A504CA7F35}" type="datetimeFigureOut">
               <a:rPr lang="en-US" smtClean="0"/>
-              <a:t>26-Jul-25</a:t>
+              <a:t>01-Aug-25</a:t>
             </a:fld>
             <a:endParaRPr lang="en-US"/>
           </a:p>
@@ -3642,7 +3642,7 @@
         </p:nvSpPr>
         <p:spPr>
           <a:xfrm>
-            <a:off x="422031" y="1702191"/>
+            <a:off x="1465219" y="1792343"/>
             <a:ext cx="3812344" cy="717452"/>
           </a:xfrm>
           <a:prstGeom prst="rect">
@@ -3689,7 +3689,7 @@
         </p:nvSpPr>
         <p:spPr>
           <a:xfrm>
-            <a:off x="422031" y="2602523"/>
+            <a:off x="1465219" y="2692675"/>
             <a:ext cx="3812344" cy="717452"/>
           </a:xfrm>
           <a:prstGeom prst="rect">
@@ -3723,6 +3723,459 @@
             <a:r>
               <a:rPr lang="en-US" dirty="0" smtClean="0"/>
               <a:t>Charts Background</a:t>
+            </a:r>
+            <a:endParaRPr lang="en-US" dirty="0"/>
+          </a:p>
+        </p:txBody>
+      </p:sp>
+      <p:sp>
+        <p:nvSpPr>
+          <p:cNvPr id="8" name="Rectangle 7"/>
+          <p:cNvSpPr/>
+          <p:nvPr/>
+        </p:nvSpPr>
+        <p:spPr>
+          <a:xfrm>
+            <a:off x="7196317" y="1792343"/>
+            <a:ext cx="3812344" cy="717452"/>
+          </a:xfrm>
+          <a:prstGeom prst="rect">
+            <a:avLst/>
+          </a:prstGeom>
+          <a:solidFill>
+            <a:srgbClr val="1D3D70"/>
+          </a:solidFill>
+        </p:spPr>
+        <p:style>
+          <a:lnRef idx="2">
+            <a:schemeClr val="accent1">
+              <a:shade val="50000"/>
+            </a:schemeClr>
+          </a:lnRef>
+          <a:fillRef idx="1">
+            <a:schemeClr val="accent1"/>
+          </a:fillRef>
+          <a:effectRef idx="0">
+            <a:schemeClr val="accent1"/>
+          </a:effectRef>
+          <a:fontRef idx="minor">
+            <a:schemeClr val="lt1"/>
+          </a:fontRef>
+        </p:style>
+        <p:txBody>
+          <a:bodyPr rtlCol="0" anchor="ctr"/>
+          <a:lstStyle/>
+          <a:p>
+            <a:pPr algn="ctr"/>
+            <a:r>
+              <a:rPr lang="en-US" dirty="0" smtClean="0"/>
+              <a:t>Sliders</a:t>
+            </a:r>
+            <a:endParaRPr lang="en-US" dirty="0"/>
+          </a:p>
+        </p:txBody>
+      </p:sp>
+      <p:sp>
+        <p:nvSpPr>
+          <p:cNvPr id="9" name="Rectangle 8"/>
+          <p:cNvSpPr/>
+          <p:nvPr/>
+        </p:nvSpPr>
+        <p:spPr>
+          <a:xfrm>
+            <a:off x="7196317" y="2692675"/>
+            <a:ext cx="3812344" cy="717452"/>
+          </a:xfrm>
+          <a:prstGeom prst="rect">
+            <a:avLst/>
+          </a:prstGeom>
+          <a:solidFill>
+            <a:srgbClr val="054380"/>
+          </a:solidFill>
+        </p:spPr>
+        <p:style>
+          <a:lnRef idx="2">
+            <a:schemeClr val="accent1">
+              <a:shade val="50000"/>
+            </a:schemeClr>
+          </a:lnRef>
+          <a:fillRef idx="1">
+            <a:schemeClr val="accent1"/>
+          </a:fillRef>
+          <a:effectRef idx="0">
+            <a:schemeClr val="accent1"/>
+          </a:effectRef>
+          <a:fontRef idx="minor">
+            <a:schemeClr val="lt1"/>
+          </a:fontRef>
+        </p:style>
+        <p:txBody>
+          <a:bodyPr rtlCol="0" anchor="ctr"/>
+          <a:lstStyle/>
+          <a:p>
+            <a:pPr algn="ctr"/>
+            <a:r>
+              <a:rPr lang="en-US" dirty="0"/>
+              <a:t> </a:t>
+            </a:r>
+            <a:r>
+              <a:rPr lang="en-US" dirty="0" smtClean="0"/>
+              <a:t>Bottom Stack / Pie</a:t>
+            </a:r>
+            <a:endParaRPr lang="en-US" dirty="0"/>
+          </a:p>
+        </p:txBody>
+      </p:sp>
+      <p:sp>
+        <p:nvSpPr>
+          <p:cNvPr id="10" name="Rectangle 9"/>
+          <p:cNvSpPr/>
+          <p:nvPr/>
+        </p:nvSpPr>
+        <p:spPr>
+          <a:xfrm>
+            <a:off x="7196317" y="3593007"/>
+            <a:ext cx="3812344" cy="717452"/>
+          </a:xfrm>
+          <a:prstGeom prst="rect">
+            <a:avLst/>
+          </a:prstGeom>
+          <a:solidFill>
+            <a:srgbClr val="317ABE"/>
+          </a:solidFill>
+        </p:spPr>
+        <p:style>
+          <a:lnRef idx="2">
+            <a:schemeClr val="accent1">
+              <a:shade val="50000"/>
+            </a:schemeClr>
+          </a:lnRef>
+          <a:fillRef idx="1">
+            <a:schemeClr val="accent1"/>
+          </a:fillRef>
+          <a:effectRef idx="0">
+            <a:schemeClr val="accent1"/>
+          </a:effectRef>
+          <a:fontRef idx="minor">
+            <a:schemeClr val="lt1"/>
+          </a:fontRef>
+        </p:style>
+        <p:txBody>
+          <a:bodyPr rtlCol="0" anchor="ctr"/>
+          <a:lstStyle/>
+          <a:p>
+            <a:pPr algn="ctr"/>
+            <a:r>
+              <a:rPr lang="en-US" dirty="0"/>
+              <a:t> </a:t>
+            </a:r>
+            <a:r>
+              <a:rPr lang="en-US" dirty="0" smtClean="0"/>
+              <a:t>Middle Stack / Pie</a:t>
+            </a:r>
+            <a:endParaRPr lang="en-US" dirty="0"/>
+          </a:p>
+        </p:txBody>
+      </p:sp>
+      <p:sp>
+        <p:nvSpPr>
+          <p:cNvPr id="11" name="Rectangle 10"/>
+          <p:cNvSpPr/>
+          <p:nvPr/>
+        </p:nvSpPr>
+        <p:spPr>
+          <a:xfrm>
+            <a:off x="7196317" y="4493339"/>
+            <a:ext cx="3812344" cy="717452"/>
+          </a:xfrm>
+          <a:prstGeom prst="rect">
+            <a:avLst/>
+          </a:prstGeom>
+          <a:solidFill>
+            <a:srgbClr val="6FB3F2"/>
+          </a:solidFill>
+          <a:ln>
+            <a:noFill/>
+          </a:ln>
+        </p:spPr>
+        <p:style>
+          <a:lnRef idx="2">
+            <a:schemeClr val="accent1">
+              <a:shade val="50000"/>
+            </a:schemeClr>
+          </a:lnRef>
+          <a:fillRef idx="1">
+            <a:schemeClr val="accent1"/>
+          </a:fillRef>
+          <a:effectRef idx="0">
+            <a:schemeClr val="accent1"/>
+          </a:effectRef>
+          <a:fontRef idx="minor">
+            <a:schemeClr val="lt1"/>
+          </a:fontRef>
+        </p:style>
+        <p:txBody>
+          <a:bodyPr rtlCol="0" anchor="ctr"/>
+          <a:lstStyle/>
+          <a:p>
+            <a:pPr algn="ctr"/>
+            <a:r>
+              <a:rPr lang="en-US" dirty="0"/>
+              <a:t> </a:t>
+            </a:r>
+            <a:r>
+              <a:rPr lang="en-US" dirty="0" smtClean="0"/>
+              <a:t>Top Stack / Pie</a:t>
+            </a:r>
+            <a:endParaRPr lang="en-US" dirty="0"/>
+          </a:p>
+        </p:txBody>
+      </p:sp>
+      <p:sp>
+        <p:nvSpPr>
+          <p:cNvPr id="12" name="Rectangle 11"/>
+          <p:cNvSpPr/>
+          <p:nvPr/>
+        </p:nvSpPr>
+        <p:spPr>
+          <a:xfrm>
+            <a:off x="7196317" y="5393671"/>
+            <a:ext cx="1215998" cy="717452"/>
+          </a:xfrm>
+          <a:prstGeom prst="rect">
+            <a:avLst/>
+          </a:prstGeom>
+          <a:solidFill>
+            <a:srgbClr val="E96D1A"/>
+          </a:solidFill>
+          <a:ln>
+            <a:noFill/>
+          </a:ln>
+        </p:spPr>
+        <p:style>
+          <a:lnRef idx="2">
+            <a:schemeClr val="accent1">
+              <a:shade val="50000"/>
+            </a:schemeClr>
+          </a:lnRef>
+          <a:fillRef idx="1">
+            <a:schemeClr val="accent1"/>
+          </a:fillRef>
+          <a:effectRef idx="0">
+            <a:schemeClr val="accent1"/>
+          </a:effectRef>
+          <a:fontRef idx="minor">
+            <a:schemeClr val="lt1"/>
+          </a:fontRef>
+        </p:style>
+        <p:txBody>
+          <a:bodyPr rtlCol="0" anchor="ctr"/>
+          <a:lstStyle/>
+          <a:p>
+            <a:pPr algn="ctr"/>
+            <a:r>
+              <a:rPr lang="en-US" dirty="0" smtClean="0"/>
+              <a:t>Day Case Line</a:t>
+            </a:r>
+            <a:endParaRPr lang="en-US" dirty="0"/>
+          </a:p>
+        </p:txBody>
+      </p:sp>
+      <p:sp>
+        <p:nvSpPr>
+          <p:cNvPr id="13" name="Rectangle 12"/>
+          <p:cNvSpPr/>
+          <p:nvPr/>
+        </p:nvSpPr>
+        <p:spPr>
+          <a:xfrm>
+            <a:off x="8494490" y="5393671"/>
+            <a:ext cx="1215998" cy="717452"/>
+          </a:xfrm>
+          <a:prstGeom prst="rect">
+            <a:avLst/>
+          </a:prstGeom>
+          <a:solidFill>
+            <a:srgbClr val="D94451"/>
+          </a:solidFill>
+          <a:ln>
+            <a:noFill/>
+          </a:ln>
+        </p:spPr>
+        <p:style>
+          <a:lnRef idx="2">
+            <a:schemeClr val="accent1">
+              <a:shade val="50000"/>
+            </a:schemeClr>
+          </a:lnRef>
+          <a:fillRef idx="1">
+            <a:schemeClr val="accent1"/>
+          </a:fillRef>
+          <a:effectRef idx="0">
+            <a:schemeClr val="accent1"/>
+          </a:effectRef>
+          <a:fontRef idx="minor">
+            <a:schemeClr val="lt1"/>
+          </a:fontRef>
+        </p:style>
+        <p:txBody>
+          <a:bodyPr rtlCol="0" anchor="ctr"/>
+          <a:lstStyle/>
+          <a:p>
+            <a:pPr algn="ctr"/>
+            <a:r>
+              <a:rPr lang="en-US" dirty="0" smtClean="0"/>
+              <a:t>Inpatient Line</a:t>
+            </a:r>
+            <a:endParaRPr lang="en-US" dirty="0"/>
+          </a:p>
+        </p:txBody>
+      </p:sp>
+      <p:sp>
+        <p:nvSpPr>
+          <p:cNvPr id="14" name="Rectangle 13"/>
+          <p:cNvSpPr/>
+          <p:nvPr/>
+        </p:nvSpPr>
+        <p:spPr>
+          <a:xfrm>
+            <a:off x="9792663" y="5393671"/>
+            <a:ext cx="1215998" cy="717452"/>
+          </a:xfrm>
+          <a:prstGeom prst="rect">
+            <a:avLst/>
+          </a:prstGeom>
+          <a:solidFill>
+            <a:srgbClr val="078CFF"/>
+          </a:solidFill>
+          <a:ln>
+            <a:noFill/>
+          </a:ln>
+        </p:spPr>
+        <p:style>
+          <a:lnRef idx="2">
+            <a:schemeClr val="accent1">
+              <a:shade val="50000"/>
+            </a:schemeClr>
+          </a:lnRef>
+          <a:fillRef idx="1">
+            <a:schemeClr val="accent1"/>
+          </a:fillRef>
+          <a:effectRef idx="0">
+            <a:schemeClr val="accent1"/>
+          </a:effectRef>
+          <a:fontRef idx="minor">
+            <a:schemeClr val="lt1"/>
+          </a:fontRef>
+        </p:style>
+        <p:txBody>
+          <a:bodyPr rtlCol="0" anchor="ctr"/>
+          <a:lstStyle/>
+          <a:p>
+            <a:pPr algn="ctr"/>
+            <a:r>
+              <a:rPr lang="en-US" dirty="0" smtClean="0"/>
+              <a:t>Outpatient Line</a:t>
+            </a:r>
+            <a:endParaRPr lang="en-US" dirty="0"/>
+          </a:p>
+        </p:txBody>
+      </p:sp>
+      <p:sp>
+        <p:nvSpPr>
+          <p:cNvPr id="15" name="Rectangle 14"/>
+          <p:cNvSpPr/>
+          <p:nvPr/>
+        </p:nvSpPr>
+        <p:spPr>
+          <a:xfrm>
+            <a:off x="1465219" y="3593007"/>
+            <a:ext cx="3812344" cy="717452"/>
+          </a:xfrm>
+          <a:prstGeom prst="rect">
+            <a:avLst/>
+          </a:prstGeom>
+          <a:solidFill>
+            <a:srgbClr val="8DC0EC"/>
+          </a:solidFill>
+          <a:ln>
+            <a:noFill/>
+          </a:ln>
+        </p:spPr>
+        <p:style>
+          <a:lnRef idx="2">
+            <a:schemeClr val="accent1">
+              <a:shade val="50000"/>
+            </a:schemeClr>
+          </a:lnRef>
+          <a:fillRef idx="1">
+            <a:schemeClr val="accent1"/>
+          </a:fillRef>
+          <a:effectRef idx="0">
+            <a:schemeClr val="accent1"/>
+          </a:effectRef>
+          <a:fontRef idx="minor">
+            <a:schemeClr val="lt1"/>
+          </a:fontRef>
+        </p:style>
+        <p:txBody>
+          <a:bodyPr rtlCol="0" anchor="ctr"/>
+          <a:lstStyle/>
+          <a:p>
+            <a:pPr algn="ctr"/>
+            <a:r>
+              <a:rPr lang="en-US" dirty="0" smtClean="0"/>
+              <a:t>Card Headline</a:t>
+            </a:r>
+            <a:endParaRPr lang="en-US" dirty="0"/>
+          </a:p>
+        </p:txBody>
+      </p:sp>
+      <p:sp>
+        <p:nvSpPr>
+          <p:cNvPr id="16" name="Rectangle 15"/>
+          <p:cNvSpPr/>
+          <p:nvPr/>
+        </p:nvSpPr>
+        <p:spPr>
+          <a:xfrm>
+            <a:off x="1465219" y="4493339"/>
+            <a:ext cx="3812344" cy="717452"/>
+          </a:xfrm>
+          <a:prstGeom prst="rect">
+            <a:avLst/>
+          </a:prstGeom>
+          <a:solidFill>
+            <a:srgbClr val="3A57B4"/>
+          </a:solidFill>
+          <a:ln>
+            <a:noFill/>
+          </a:ln>
+        </p:spPr>
+        <p:style>
+          <a:lnRef idx="2">
+            <a:schemeClr val="accent1">
+              <a:shade val="50000"/>
+            </a:schemeClr>
+          </a:lnRef>
+          <a:fillRef idx="1">
+            <a:schemeClr val="accent1"/>
+          </a:fillRef>
+          <a:effectRef idx="0">
+            <a:schemeClr val="accent1"/>
+          </a:effectRef>
+          <a:fontRef idx="minor">
+            <a:schemeClr val="lt1"/>
+          </a:fontRef>
+        </p:style>
+        <p:txBody>
+          <a:bodyPr rtlCol="0" anchor="ctr"/>
+          <a:lstStyle/>
+          <a:p>
+            <a:pPr algn="ctr"/>
+            <a:r>
+              <a:rPr lang="en-US" dirty="0" smtClean="0"/>
+              <a:t>Box Outline</a:t>
             </a:r>
             <a:endParaRPr lang="en-US" dirty="0"/>
           </a:p>

</xml_diff>